<commit_message>
Swap PAS1 and PAS2 in documentation
</commit_message>
<xml_diff>
--- a/Documentation/Torquesensoremulator.pptx
+++ b/Documentation/Torquesensoremulator.pptx
@@ -263,7 +263,7 @@
           <a:p>
             <a:fld id="{93DB7454-F8C2-40ED-93F2-FC3C48C31225}" type="datetimeFigureOut">
               <a:rPr lang="de-DE" smtClean="0"/>
-              <a:t>09.11.2025</a:t>
+              <a:t>16.11.2025</a:t>
             </a:fld>
             <a:endParaRPr lang="de-DE"/>
           </a:p>
@@ -461,7 +461,7 @@
           <a:p>
             <a:fld id="{93DB7454-F8C2-40ED-93F2-FC3C48C31225}" type="datetimeFigureOut">
               <a:rPr lang="de-DE" smtClean="0"/>
-              <a:t>09.11.2025</a:t>
+              <a:t>16.11.2025</a:t>
             </a:fld>
             <a:endParaRPr lang="de-DE"/>
           </a:p>
@@ -669,7 +669,7 @@
           <a:p>
             <a:fld id="{93DB7454-F8C2-40ED-93F2-FC3C48C31225}" type="datetimeFigureOut">
               <a:rPr lang="de-DE" smtClean="0"/>
-              <a:t>09.11.2025</a:t>
+              <a:t>16.11.2025</a:t>
             </a:fld>
             <a:endParaRPr lang="de-DE"/>
           </a:p>
@@ -867,7 +867,7 @@
           <a:p>
             <a:fld id="{93DB7454-F8C2-40ED-93F2-FC3C48C31225}" type="datetimeFigureOut">
               <a:rPr lang="de-DE" smtClean="0"/>
-              <a:t>09.11.2025</a:t>
+              <a:t>16.11.2025</a:t>
             </a:fld>
             <a:endParaRPr lang="de-DE"/>
           </a:p>
@@ -1142,7 +1142,7 @@
           <a:p>
             <a:fld id="{93DB7454-F8C2-40ED-93F2-FC3C48C31225}" type="datetimeFigureOut">
               <a:rPr lang="de-DE" smtClean="0"/>
-              <a:t>09.11.2025</a:t>
+              <a:t>16.11.2025</a:t>
             </a:fld>
             <a:endParaRPr lang="de-DE"/>
           </a:p>
@@ -1407,7 +1407,7 @@
           <a:p>
             <a:fld id="{93DB7454-F8C2-40ED-93F2-FC3C48C31225}" type="datetimeFigureOut">
               <a:rPr lang="de-DE" smtClean="0"/>
-              <a:t>09.11.2025</a:t>
+              <a:t>16.11.2025</a:t>
             </a:fld>
             <a:endParaRPr lang="de-DE"/>
           </a:p>
@@ -1819,7 +1819,7 @@
           <a:p>
             <a:fld id="{93DB7454-F8C2-40ED-93F2-FC3C48C31225}" type="datetimeFigureOut">
               <a:rPr lang="de-DE" smtClean="0"/>
-              <a:t>09.11.2025</a:t>
+              <a:t>16.11.2025</a:t>
             </a:fld>
             <a:endParaRPr lang="de-DE"/>
           </a:p>
@@ -1960,7 +1960,7 @@
           <a:p>
             <a:fld id="{93DB7454-F8C2-40ED-93F2-FC3C48C31225}" type="datetimeFigureOut">
               <a:rPr lang="de-DE" smtClean="0"/>
-              <a:t>09.11.2025</a:t>
+              <a:t>16.11.2025</a:t>
             </a:fld>
             <a:endParaRPr lang="de-DE"/>
           </a:p>
@@ -2073,7 +2073,7 @@
           <a:p>
             <a:fld id="{93DB7454-F8C2-40ED-93F2-FC3C48C31225}" type="datetimeFigureOut">
               <a:rPr lang="de-DE" smtClean="0"/>
-              <a:t>09.11.2025</a:t>
+              <a:t>16.11.2025</a:t>
             </a:fld>
             <a:endParaRPr lang="de-DE"/>
           </a:p>
@@ -2384,7 +2384,7 @@
           <a:p>
             <a:fld id="{93DB7454-F8C2-40ED-93F2-FC3C48C31225}" type="datetimeFigureOut">
               <a:rPr lang="de-DE" smtClean="0"/>
-              <a:t>09.11.2025</a:t>
+              <a:t>16.11.2025</a:t>
             </a:fld>
             <a:endParaRPr lang="de-DE"/>
           </a:p>
@@ -2672,7 +2672,7 @@
           <a:p>
             <a:fld id="{93DB7454-F8C2-40ED-93F2-FC3C48C31225}" type="datetimeFigureOut">
               <a:rPr lang="de-DE" smtClean="0"/>
-              <a:t>09.11.2025</a:t>
+              <a:t>16.11.2025</a:t>
             </a:fld>
             <a:endParaRPr lang="de-DE"/>
           </a:p>
@@ -2913,7 +2913,7 @@
           <a:p>
             <a:fld id="{93DB7454-F8C2-40ED-93F2-FC3C48C31225}" type="datetimeFigureOut">
               <a:rPr lang="de-DE" smtClean="0"/>
-              <a:t>09.11.2025</a:t>
+              <a:t>16.11.2025</a:t>
             </a:fld>
             <a:endParaRPr lang="de-DE"/>
           </a:p>
@@ -5066,7 +5066,7 @@
         </p:nvSpPr>
         <p:spPr>
           <a:xfrm>
-            <a:off x="1964300" y="4184698"/>
+            <a:off x="1964300" y="3988446"/>
             <a:ext cx="1093761" cy="276999"/>
           </a:xfrm>
           <a:prstGeom prst="rect">
@@ -5102,7 +5102,7 @@
         </p:nvSpPr>
         <p:spPr>
           <a:xfrm>
-            <a:off x="1964299" y="3985433"/>
+            <a:off x="1954366" y="4174208"/>
             <a:ext cx="1093762" cy="276999"/>
           </a:xfrm>
           <a:prstGeom prst="rect">
@@ -5282,7 +5282,7 @@
         </p:nvSpPr>
         <p:spPr>
           <a:xfrm>
-            <a:off x="1981416" y="2393291"/>
+            <a:off x="1981416" y="2199302"/>
             <a:ext cx="1093761" cy="276999"/>
           </a:xfrm>
           <a:prstGeom prst="rect">
@@ -5318,7 +5318,7 @@
         </p:nvSpPr>
         <p:spPr>
           <a:xfrm>
-            <a:off x="1981415" y="2194026"/>
+            <a:off x="1966466" y="2407341"/>
             <a:ext cx="1093762" cy="276999"/>
           </a:xfrm>
           <a:prstGeom prst="rect">

</xml_diff>